<commit_message>
scanner.close ve math.random, random araştırıldı.
</commit_message>
<xml_diff>
--- a/Turkcell_bootcamp_ArdaKozan.pptx
+++ b/Turkcell_bootcamp_ArdaKozan.pptx
@@ -105,6 +105,8 @@
     <p:sldId id="354" r:id="rId99"/>
     <p:sldId id="355" r:id="rId100"/>
     <p:sldId id="356" r:id="rId101"/>
+    <p:sldId id="357" r:id="rId102"/>
+    <p:sldId id="358" r:id="rId103"/>
   </p:sldIdLst>
   <p:sldSz cx="12192000" cy="6858000"/>
   <p:notesSz cx="6858000" cy="9144000"/>
@@ -530,6 +532,19 @@
             <p14:sldId id="356"/>
           </p14:sldIdLst>
         </p14:section>
+        <p14:section name="21 Haziran 2022" id="{4544A248-12DB-4EBF-A993-A5B624A4A8C9}">
+          <p14:sldIdLst/>
+        </p14:section>
+        <p14:section name="1. Soru (Scanner.close() )" id="{9DCD02FB-1384-42F1-AAAC-7F348C824054}">
+          <p14:sldIdLst>
+            <p14:sldId id="357"/>
+          </p14:sldIdLst>
+        </p14:section>
+        <p14:section name="2. Soru (Math.random ve Random class farkı)" id="{9B60BCA4-CD18-4692-B3AE-61D12F850172}">
+          <p14:sldIdLst>
+            <p14:sldId id="358"/>
+          </p14:sldIdLst>
+        </p14:section>
       </p14:sectionLst>
     </p:ext>
     <p:ext uri="{EFAFB233-063F-42B5-8137-9DF3F51BA10A}">
@@ -702,7 +717,7 @@
           <a:p>
             <a:fld id="{1160EA64-D806-43AC-9DF2-F8C432F32B4C}" type="datetimeFigureOut">
               <a:rPr lang="en-US" dirty="0"/>
-              <a:t>6/21/2022</a:t>
+              <a:t>6/22/2022</a:t>
             </a:fld>
             <a:endParaRPr lang="en-US" dirty="0"/>
           </a:p>
@@ -868,7 +883,7 @@
           <a:p>
             <a:fld id="{E9F9C37B-1D36-470B-8223-D6C91242EC14}" type="datetimeFigureOut">
               <a:rPr lang="en-US" dirty="0"/>
-              <a:t>6/21/2022</a:t>
+              <a:t>6/22/2022</a:t>
             </a:fld>
             <a:endParaRPr lang="en-US" dirty="0"/>
           </a:p>
@@ -1043,7 +1058,7 @@
           <a:p>
             <a:fld id="{67C6F52A-A82B-47A2-A83A-8C4C91F2D59F}" type="datetimeFigureOut">
               <a:rPr lang="en-US" dirty="0"/>
-              <a:t>6/21/2022</a:t>
+              <a:t>6/22/2022</a:t>
             </a:fld>
             <a:endParaRPr lang="en-US" dirty="0"/>
           </a:p>
@@ -1208,7 +1223,7 @@
           <a:p>
             <a:fld id="{F070A7B3-6521-4DCA-87E5-044747A908C1}" type="datetimeFigureOut">
               <a:rPr lang="en-US" dirty="0"/>
-              <a:t>6/21/2022</a:t>
+              <a:t>6/22/2022</a:t>
             </a:fld>
             <a:endParaRPr lang="en-US" dirty="0"/>
           </a:p>
@@ -1472,7 +1487,7 @@
           <a:p>
             <a:fld id="{1160EA64-D806-43AC-9DF2-F8C432F32B4C}" type="datetimeFigureOut">
               <a:rPr lang="en-US" dirty="0"/>
-              <a:t>6/21/2022</a:t>
+              <a:t>6/22/2022</a:t>
             </a:fld>
             <a:endParaRPr lang="en-US" dirty="0"/>
           </a:p>
@@ -1700,7 +1715,7 @@
           <a:p>
             <a:fld id="{AB134690-1557-4C89-A502-4959FE7FAD70}" type="datetimeFigureOut">
               <a:rPr lang="en-US" dirty="0"/>
-              <a:t>6/21/2022</a:t>
+              <a:t>6/22/2022</a:t>
             </a:fld>
             <a:endParaRPr lang="en-US" dirty="0"/>
           </a:p>
@@ -2054,7 +2069,7 @@
           <a:p>
             <a:fld id="{4F7D4976-E339-4826-83B7-FBD03F55ECF8}" type="datetimeFigureOut">
               <a:rPr lang="en-US" dirty="0"/>
-              <a:t>6/21/2022</a:t>
+              <a:t>6/22/2022</a:t>
             </a:fld>
             <a:endParaRPr lang="en-US" dirty="0"/>
           </a:p>
@@ -2190,7 +2205,7 @@
           <a:p>
             <a:fld id="{E1037C31-9E7A-4F99-8774-A0E530DE1A42}" type="datetimeFigureOut">
               <a:rPr lang="en-US" dirty="0"/>
-              <a:t>6/21/2022</a:t>
+              <a:t>6/22/2022</a:t>
             </a:fld>
             <a:endParaRPr lang="en-US" dirty="0"/>
           </a:p>
@@ -2280,7 +2295,7 @@
           <a:p>
             <a:fld id="{C278504F-A551-4DE0-9316-4DCD1D8CC752}" type="datetimeFigureOut">
               <a:rPr lang="en-US" dirty="0"/>
-              <a:t>6/21/2022</a:t>
+              <a:t>6/22/2022</a:t>
             </a:fld>
             <a:endParaRPr lang="en-US" dirty="0"/>
           </a:p>
@@ -2632,7 +2647,7 @@
           <a:p>
             <a:fld id="{D1BE4249-C0D0-4B06-8692-E8BB871AF643}" type="datetimeFigureOut">
               <a:rPr lang="en-US" dirty="0"/>
-              <a:t>6/21/2022</a:t>
+              <a:t>6/22/2022</a:t>
             </a:fld>
             <a:endParaRPr lang="en-US" dirty="0"/>
           </a:p>
@@ -2984,7 +2999,7 @@
           <a:p>
             <a:fld id="{042B0DB6-F5C7-45FB-8CF3-31B45F9C2DAC}" type="datetimeFigureOut">
               <a:rPr lang="en-US" dirty="0"/>
-              <a:t>6/21/2022</a:t>
+              <a:t>6/22/2022</a:t>
             </a:fld>
             <a:endParaRPr lang="en-US" dirty="0"/>
           </a:p>
@@ -3220,7 +3235,7 @@
           <a:p>
             <a:fld id="{1160EA64-D806-43AC-9DF2-F8C432F32B4C}" type="datetimeFigureOut">
               <a:rPr lang="en-US" dirty="0"/>
-              <a:t>6/21/2022</a:t>
+              <a:t>6/22/2022</a:t>
             </a:fld>
             <a:endParaRPr lang="en-US" dirty="0"/>
           </a:p>
@@ -3957,6 +3972,416 @@
 </p:sld>
 </file>
 
+<file path=ppt/slides/slide101.xml><?xml version="1.0" encoding="utf-8"?>
+<p:sld xmlns:a="http://schemas.openxmlformats.org/drawingml/2006/main" xmlns:r="http://schemas.openxmlformats.org/officeDocument/2006/relationships" xmlns:p="http://schemas.openxmlformats.org/presentationml/2006/main">
+  <p:cSld>
+    <p:spTree>
+      <p:nvGrpSpPr>
+        <p:cNvPr id="1" name=""/>
+        <p:cNvGrpSpPr/>
+        <p:nvPr/>
+      </p:nvGrpSpPr>
+      <p:grpSpPr>
+        <a:xfrm>
+          <a:off x="0" y="0"/>
+          <a:ext cx="0" cy="0"/>
+          <a:chOff x="0" y="0"/>
+          <a:chExt cx="0" cy="0"/>
+        </a:xfrm>
+      </p:grpSpPr>
+      <p:sp>
+        <p:nvSpPr>
+          <p:cNvPr id="2" name="Title 1">
+            <a:extLst>
+              <a:ext uri="{FF2B5EF4-FFF2-40B4-BE49-F238E27FC236}">
+                <a16:creationId xmlns:a16="http://schemas.microsoft.com/office/drawing/2014/main" id="{8D632096-1499-498E-80BF-42CBF79AF2CA}"/>
+              </a:ext>
+            </a:extLst>
+          </p:cNvPr>
+          <p:cNvSpPr>
+            <a:spLocks noGrp="1"/>
+          </p:cNvSpPr>
+          <p:nvPr>
+            <p:ph type="title"/>
+          </p:nvPr>
+        </p:nvSpPr>
+        <p:spPr/>
+        <p:txBody>
+          <a:bodyPr/>
+          <a:lstStyle/>
+          <a:p>
+            <a:r>
+              <a:rPr lang="tr-TR" dirty="0" err="1"/>
+              <a:t>Scanner.close</a:t>
+            </a:r>
+            <a:r>
+              <a:rPr lang="tr-TR" dirty="0"/>
+              <a:t>()</a:t>
+            </a:r>
+          </a:p>
+        </p:txBody>
+      </p:sp>
+      <p:sp>
+        <p:nvSpPr>
+          <p:cNvPr id="3" name="Content Placeholder 2">
+            <a:extLst>
+              <a:ext uri="{FF2B5EF4-FFF2-40B4-BE49-F238E27FC236}">
+                <a16:creationId xmlns:a16="http://schemas.microsoft.com/office/drawing/2014/main" id="{475146E6-B424-427A-B54D-EB72804EB7A6}"/>
+              </a:ext>
+            </a:extLst>
+          </p:cNvPr>
+          <p:cNvSpPr>
+            <a:spLocks noGrp="1"/>
+          </p:cNvSpPr>
+          <p:nvPr>
+            <p:ph idx="1"/>
+          </p:nvPr>
+        </p:nvSpPr>
+        <p:spPr/>
+        <p:txBody>
+          <a:bodyPr/>
+          <a:lstStyle/>
+          <a:p>
+            <a:pPr marL="0" indent="0">
+              <a:buNone/>
+            </a:pPr>
+            <a:r>
+              <a:rPr lang="tr-TR" dirty="0"/>
+              <a:t>System.in objesi JVM tarafından açıldığı için, parametre olarak System.in objesi alan </a:t>
+            </a:r>
+            <a:r>
+              <a:rPr lang="tr-TR" dirty="0" err="1"/>
+              <a:t>Scanner</a:t>
+            </a:r>
+            <a:r>
+              <a:rPr lang="tr-TR" dirty="0"/>
+              <a:t> objesi kapatıldığında System.in objesi de kapatılmış olur. Bu durum programın akışını bozmaktadır. Bu yüzden </a:t>
+            </a:r>
+            <a:r>
+              <a:rPr lang="tr-TR" dirty="0" err="1"/>
+              <a:t>scanner.close</a:t>
+            </a:r>
+            <a:r>
+              <a:rPr lang="tr-TR" dirty="0"/>
+              <a:t>() metodu kullanılmamalıdır.</a:t>
+            </a:r>
+          </a:p>
+        </p:txBody>
+      </p:sp>
+    </p:spTree>
+    <p:extLst>
+      <p:ext uri="{BB962C8B-B14F-4D97-AF65-F5344CB8AC3E}">
+        <p14:creationId xmlns:p14="http://schemas.microsoft.com/office/powerpoint/2010/main" val="2767706998"/>
+      </p:ext>
+    </p:extLst>
+  </p:cSld>
+  <p:clrMapOvr>
+    <a:masterClrMapping/>
+  </p:clrMapOvr>
+</p:sld>
+</file>
+
+<file path=ppt/slides/slide102.xml><?xml version="1.0" encoding="utf-8"?>
+<p:sld xmlns:a="http://schemas.openxmlformats.org/drawingml/2006/main" xmlns:r="http://schemas.openxmlformats.org/officeDocument/2006/relationships" xmlns:p="http://schemas.openxmlformats.org/presentationml/2006/main">
+  <p:cSld>
+    <p:spTree>
+      <p:nvGrpSpPr>
+        <p:cNvPr id="1" name=""/>
+        <p:cNvGrpSpPr/>
+        <p:nvPr/>
+      </p:nvGrpSpPr>
+      <p:grpSpPr>
+        <a:xfrm>
+          <a:off x="0" y="0"/>
+          <a:ext cx="0" cy="0"/>
+          <a:chOff x="0" y="0"/>
+          <a:chExt cx="0" cy="0"/>
+        </a:xfrm>
+      </p:grpSpPr>
+      <p:sp>
+        <p:nvSpPr>
+          <p:cNvPr id="2" name="Title 1">
+            <a:extLst>
+              <a:ext uri="{FF2B5EF4-FFF2-40B4-BE49-F238E27FC236}">
+                <a16:creationId xmlns:a16="http://schemas.microsoft.com/office/drawing/2014/main" id="{870CCD9E-E265-4795-8EDC-AF7B6246321F}"/>
+              </a:ext>
+            </a:extLst>
+          </p:cNvPr>
+          <p:cNvSpPr>
+            <a:spLocks noGrp="1"/>
+          </p:cNvSpPr>
+          <p:nvPr>
+            <p:ph type="title"/>
+          </p:nvPr>
+        </p:nvSpPr>
+        <p:spPr/>
+        <p:txBody>
+          <a:bodyPr/>
+          <a:lstStyle/>
+          <a:p>
+            <a:r>
+              <a:rPr lang="tr-TR" dirty="0" err="1"/>
+              <a:t>Math.random</a:t>
+            </a:r>
+            <a:r>
+              <a:rPr lang="tr-TR" dirty="0"/>
+              <a:t> – </a:t>
+            </a:r>
+            <a:r>
+              <a:rPr lang="tr-TR" dirty="0" err="1"/>
+              <a:t>random</a:t>
+            </a:r>
+            <a:r>
+              <a:rPr lang="tr-TR" dirty="0"/>
+              <a:t> </a:t>
+            </a:r>
+            <a:r>
+              <a:rPr lang="tr-TR" dirty="0" err="1"/>
+              <a:t>class</a:t>
+            </a:r>
+            <a:r>
+              <a:rPr lang="tr-TR" dirty="0"/>
+              <a:t> farkı</a:t>
+            </a:r>
+          </a:p>
+        </p:txBody>
+      </p:sp>
+      <p:sp>
+        <p:nvSpPr>
+          <p:cNvPr id="3" name="Content Placeholder 2">
+            <a:extLst>
+              <a:ext uri="{FF2B5EF4-FFF2-40B4-BE49-F238E27FC236}">
+                <a16:creationId xmlns:a16="http://schemas.microsoft.com/office/drawing/2014/main" id="{2C5CDFE6-6620-4052-AF5F-7EDD8E296B2E}"/>
+              </a:ext>
+            </a:extLst>
+          </p:cNvPr>
+          <p:cNvSpPr>
+            <a:spLocks noGrp="1"/>
+          </p:cNvSpPr>
+          <p:nvPr>
+            <p:ph idx="1"/>
+          </p:nvPr>
+        </p:nvSpPr>
+        <p:spPr>
+          <a:xfrm>
+            <a:off x="2231136" y="2638044"/>
+            <a:ext cx="7729728" cy="3894561"/>
+          </a:xfrm>
+        </p:spPr>
+        <p:txBody>
+          <a:bodyPr/>
+          <a:lstStyle/>
+          <a:p>
+            <a:r>
+              <a:rPr lang="tr-TR" dirty="0"/>
+              <a:t>Aslında </a:t>
+            </a:r>
+            <a:r>
+              <a:rPr lang="tr-TR" dirty="0" err="1"/>
+              <a:t>math.random</a:t>
+            </a:r>
+            <a:r>
+              <a:rPr lang="tr-TR" dirty="0"/>
+              <a:t>() metodu </a:t>
+            </a:r>
+            <a:r>
+              <a:rPr lang="tr-TR" dirty="0" err="1"/>
+              <a:t>static</a:t>
+            </a:r>
+            <a:r>
+              <a:rPr lang="tr-TR" dirty="0"/>
+              <a:t> olduğu için direkt kullanılabilir ancak </a:t>
+            </a:r>
+            <a:r>
+              <a:rPr lang="tr-TR" dirty="0" err="1"/>
+              <a:t>random</a:t>
+            </a:r>
+            <a:r>
+              <a:rPr lang="tr-TR" dirty="0"/>
+              <a:t> </a:t>
+            </a:r>
+            <a:r>
+              <a:rPr lang="tr-TR" dirty="0" err="1"/>
+              <a:t>class</a:t>
+            </a:r>
+            <a:r>
+              <a:rPr lang="tr-TR" dirty="0"/>
+              <a:t> aracılığıyla </a:t>
+            </a:r>
+            <a:r>
+              <a:rPr lang="tr-TR" dirty="0" err="1"/>
+              <a:t>random</a:t>
+            </a:r>
+            <a:r>
+              <a:rPr lang="tr-TR" dirty="0"/>
+              <a:t> sayı üretilmesi gerektiğinde </a:t>
+            </a:r>
+            <a:r>
+              <a:rPr lang="tr-TR" dirty="0" err="1"/>
+              <a:t>random</a:t>
+            </a:r>
+            <a:r>
+              <a:rPr lang="tr-TR" dirty="0"/>
+              <a:t> </a:t>
+            </a:r>
+            <a:r>
+              <a:rPr lang="tr-TR" dirty="0" err="1"/>
+              <a:t>class’ın</a:t>
+            </a:r>
+            <a:r>
+              <a:rPr lang="tr-TR" dirty="0"/>
+              <a:t> bir objesi üretilmesi gerekmektedir. Bu durumda birden fazla </a:t>
+            </a:r>
+            <a:r>
+              <a:rPr lang="tr-TR" dirty="0" err="1"/>
+              <a:t>random</a:t>
+            </a:r>
+            <a:r>
+              <a:rPr lang="tr-TR" dirty="0"/>
+              <a:t> sayı üretilmesi gereken yerlerde </a:t>
+            </a:r>
+            <a:r>
+              <a:rPr lang="tr-TR" dirty="0" err="1"/>
+              <a:t>random</a:t>
+            </a:r>
+            <a:r>
+              <a:rPr lang="tr-TR" dirty="0"/>
+              <a:t> </a:t>
+            </a:r>
+            <a:r>
+              <a:rPr lang="tr-TR" dirty="0" err="1"/>
+              <a:t>class’ı</a:t>
+            </a:r>
+            <a:r>
+              <a:rPr lang="tr-TR" dirty="0"/>
+              <a:t> ile </a:t>
+            </a:r>
+            <a:r>
+              <a:rPr lang="tr-TR" dirty="0" err="1"/>
+              <a:t>random</a:t>
+            </a:r>
+            <a:r>
+              <a:rPr lang="tr-TR" dirty="0"/>
+              <a:t> sayı üretme kullanılabilir.</a:t>
+            </a:r>
+          </a:p>
+          <a:p>
+            <a:r>
+              <a:rPr lang="tr-TR" dirty="0" err="1"/>
+              <a:t>Math.random</a:t>
+            </a:r>
+            <a:r>
+              <a:rPr lang="tr-TR" dirty="0"/>
+              <a:t>() metodu da incelendiğinde </a:t>
+            </a:r>
+            <a:r>
+              <a:rPr lang="tr-TR" dirty="0" err="1"/>
+              <a:t>random</a:t>
+            </a:r>
+            <a:r>
+              <a:rPr lang="tr-TR" dirty="0"/>
+              <a:t> </a:t>
+            </a:r>
+            <a:r>
+              <a:rPr lang="tr-TR" dirty="0" err="1"/>
+              <a:t>class’ın</a:t>
+            </a:r>
+            <a:r>
+              <a:rPr lang="tr-TR" dirty="0"/>
+              <a:t> bir metodunu kullandığı görülmektedir.</a:t>
+            </a:r>
+          </a:p>
+          <a:p>
+            <a:r>
+              <a:rPr lang="tr-TR" dirty="0" err="1"/>
+              <a:t>Math.random</a:t>
+            </a:r>
+            <a:r>
+              <a:rPr lang="tr-TR" dirty="0"/>
+              <a:t>() metodu, </a:t>
+            </a:r>
+            <a:r>
+              <a:rPr lang="tr-TR" dirty="0" err="1"/>
+              <a:t>double</a:t>
+            </a:r>
+            <a:r>
+              <a:rPr lang="tr-TR" dirty="0"/>
+              <a:t> tipinde 0.0 ile 1.0 arasında sayı üretir. Bu sayı toplama, çıkarma, çarpma, bölme yaparak istenilen aralığa getirilir. </a:t>
+            </a:r>
+          </a:p>
+          <a:p>
+            <a:r>
+              <a:rPr lang="tr-TR" dirty="0" err="1"/>
+              <a:t>Random</a:t>
+            </a:r>
+            <a:r>
+              <a:rPr lang="tr-TR" dirty="0"/>
+              <a:t> </a:t>
+            </a:r>
+            <a:r>
+              <a:rPr lang="tr-TR" dirty="0" err="1"/>
+              <a:t>class’ı</a:t>
+            </a:r>
+            <a:r>
+              <a:rPr lang="tr-TR" dirty="0"/>
+              <a:t> objesi ise </a:t>
+            </a:r>
+            <a:r>
+              <a:rPr lang="tr-TR" dirty="0" err="1"/>
+              <a:t>boolean</a:t>
+            </a:r>
+            <a:r>
+              <a:rPr lang="tr-TR" dirty="0"/>
+              <a:t>, </a:t>
+            </a:r>
+            <a:r>
+              <a:rPr lang="tr-TR" dirty="0" err="1"/>
+              <a:t>double</a:t>
+            </a:r>
+            <a:r>
+              <a:rPr lang="tr-TR" dirty="0"/>
+              <a:t>, </a:t>
+            </a:r>
+            <a:r>
+              <a:rPr lang="tr-TR" dirty="0" err="1"/>
+              <a:t>float</a:t>
+            </a:r>
+            <a:r>
+              <a:rPr lang="tr-TR" dirty="0"/>
+              <a:t>, </a:t>
+            </a:r>
+            <a:r>
+              <a:rPr lang="tr-TR" dirty="0" err="1"/>
+              <a:t>int</a:t>
+            </a:r>
+            <a:r>
+              <a:rPr lang="tr-TR" dirty="0"/>
+              <a:t>, </a:t>
+            </a:r>
+            <a:r>
+              <a:rPr lang="tr-TR" dirty="0" err="1"/>
+              <a:t>long</a:t>
+            </a:r>
+            <a:r>
+              <a:rPr lang="tr-TR" dirty="0"/>
+              <a:t> tipinde direkt olarak değer üretebilir.</a:t>
+            </a:r>
+          </a:p>
+        </p:txBody>
+      </p:sp>
+    </p:spTree>
+    <p:extLst>
+      <p:ext uri="{BB962C8B-B14F-4D97-AF65-F5344CB8AC3E}">
+        <p14:creationId xmlns:p14="http://schemas.microsoft.com/office/powerpoint/2010/main" val="1727337106"/>
+      </p:ext>
+    </p:extLst>
+  </p:cSld>
+  <p:clrMapOvr>
+    <a:masterClrMapping/>
+  </p:clrMapOvr>
+</p:sld>
+</file>
+
 <file path=ppt/slides/slide11.xml><?xml version="1.0" encoding="utf-8"?>
 <p:sld xmlns:a="http://schemas.openxmlformats.org/drawingml/2006/main" xmlns:r="http://schemas.openxmlformats.org/officeDocument/2006/relationships" xmlns:p="http://schemas.openxmlformats.org/presentationml/2006/main">
   <p:cSld>

</xml_diff>